<commit_message>
Fix logo nella presentazione
</commit_message>
<xml_diff>
--- a/Presentazione.pptx
+++ b/Presentazione.pptx
@@ -146,6 +146,11 @@
       </a:defRPr>
     </a:lvl9pPr>
   </p:defaultTextStyle>
+  <p:extLst>
+    <p:ext uri="{EFAFB233-063F-42B5-8137-9DF3F51BA10A}">
+      <p15:sldGuideLst xmlns:p15="http://schemas.microsoft.com/office/powerpoint/2012/main"/>
+    </p:ext>
+  </p:extLst>
 </p:presentation>
 </file>
 
@@ -7247,10 +7252,10 @@
       </p:sp>
       <p:pic>
         <p:nvPicPr>
-          <p:cNvPr id="14" name="Immagine 13">
-            <a:extLst>
-              <a:ext uri="{FF2B5EF4-FFF2-40B4-BE49-F238E27FC236}">
-                <a16:creationId xmlns:a16="http://schemas.microsoft.com/office/drawing/2014/main" id="{22F48F5F-7125-2A10-0723-B8BA8EDBE601}"/>
+          <p:cNvPr id="3" name="Immagine 2" descr="Immagine che contiene testo, clipart&#10;&#10;Descrizione generata automaticamente">
+            <a:extLst>
+              <a:ext uri="{FF2B5EF4-FFF2-40B4-BE49-F238E27FC236}">
+                <a16:creationId xmlns:a16="http://schemas.microsoft.com/office/drawing/2014/main" id="{F515A1A4-91DD-6842-8C21-B4E7324A003E}"/>
               </a:ext>
             </a:extLst>
           </p:cNvPr>
@@ -7273,8 +7278,8 @@
         </p:blipFill>
         <p:spPr>
           <a:xfrm>
-            <a:off x="3107328" y="672813"/>
-            <a:ext cx="5588395" cy="1925414"/>
+            <a:off x="3107328" y="643083"/>
+            <a:ext cx="6166580" cy="2124619"/>
           </a:xfrm>
           <a:prstGeom prst="rect">
             <a:avLst/>

</xml_diff>